<commit_message>
ready to run AlexNet
</commit_message>
<xml_diff>
--- a/proj6_template.pptx
+++ b/proj6_template.pptx
@@ -1261,7 +1261,7 @@
         </p:nvSpPr>
         <p:spPr>
           <a:xfrm>
-            <a:off x="381300" y="685800"/>
+            <a:off x="381000" y="685800"/>
             <a:ext cx="6096000" cy="3429000"/>
           </a:xfrm>
           <a:custGeom>
@@ -1365,7 +1365,7 @@
         </p:nvSpPr>
         <p:spPr>
           <a:xfrm>
-            <a:off x="381300" y="685800"/>
+            <a:off x="381000" y="685800"/>
             <a:ext cx="6096000" cy="3429000"/>
           </a:xfrm>
           <a:custGeom>
@@ -7388,9 +7388,13 @@
             </a:pPr>
             <a:r>
               <a:rPr lang="en" b="1" dirty="0"/>
-              <a:t>Part 1: Your Training History Plots</a:t>
-            </a:r>
-            <a:endParaRPr b="1" dirty="0"/>
+              <a:t>Part 1: Your Training History </a:t>
+            </a:r>
+            <a:r>
+              <a:rPr lang="en" b="1" dirty="0" smtClean="0"/>
+              <a:t>Plots</a:t>
+            </a:r>
+            <a:endParaRPr b="1" dirty="0" smtClean="0"/>
           </a:p>
           <a:p>
             <a:pPr marL="0" lvl="0" indent="0" algn="l" rtl="0">
@@ -7403,10 +7407,22 @@
               <a:buNone/>
             </a:pPr>
             <a:r>
-              <a:rPr lang="en" dirty="0"/>
-              <a:t>&lt;Loss plot here&gt;				&lt;Accuracy plot here&gt;</a:t>
-            </a:r>
-            <a:endParaRPr dirty="0"/>
+              <a:rPr lang="en" dirty="0" smtClean="0"/>
+              <a:t>				</a:t>
+            </a:r>
+            <a:endParaRPr lang="en-US" dirty="0" smtClean="0"/>
+          </a:p>
+          <a:p>
+            <a:pPr marL="0" lvl="0" indent="0" algn="l" rtl="0">
+              <a:spcBef>
+                <a:spcPts val="1600"/>
+              </a:spcBef>
+              <a:spcAft>
+                <a:spcPts val="0"/>
+              </a:spcAft>
+              <a:buNone/>
+            </a:pPr>
+            <a:endParaRPr dirty="0" smtClean="0"/>
           </a:p>
           <a:p>
             <a:pPr marL="0" lvl="0" indent="0" algn="l" rtl="0">
@@ -7466,54 +7482,127 @@
               </a:spcAft>
               <a:buNone/>
             </a:pPr>
+            <a:endParaRPr dirty="0" smtClean="0"/>
+          </a:p>
+          <a:p>
+            <a:pPr marL="0" lvl="0" indent="0">
+              <a:spcBef>
+                <a:spcPts val="1600"/>
+              </a:spcBef>
+              <a:buNone/>
+            </a:pPr>
+            <a:r>
+              <a:rPr lang="en" dirty="0" smtClean="0"/>
+              <a:t>Final </a:t>
+            </a:r>
+            <a:r>
+              <a:rPr lang="en" dirty="0"/>
+              <a:t>training accuracy value</a:t>
+            </a:r>
+            <a:r>
+              <a:rPr lang="en" dirty="0" smtClean="0"/>
+              <a:t>:</a:t>
+            </a:r>
+            <a:r>
+              <a:rPr lang="en-US" dirty="0" smtClean="0"/>
+              <a:t> </a:t>
+            </a:r>
+            <a:r>
+              <a:rPr lang="fi-FI" dirty="0"/>
+              <a:t>0.7035175879396985</a:t>
+            </a:r>
             <a:endParaRPr dirty="0"/>
           </a:p>
           <a:p>
-            <a:pPr marL="0" lvl="0" indent="0" algn="l" rtl="0">
-              <a:spcBef>
-                <a:spcPts val="1600"/>
-              </a:spcBef>
-              <a:spcAft>
-                <a:spcPts val="0"/>
+            <a:pPr marL="0" lvl="0" indent="0">
+              <a:spcBef>
+                <a:spcPts val="1600"/>
+              </a:spcBef>
+              <a:spcAft>
+                <a:spcPts val="1600"/>
               </a:spcAft>
               <a:buNone/>
             </a:pPr>
-            <a:endParaRPr dirty="0"/>
-          </a:p>
-          <a:p>
-            <a:pPr marL="0" lvl="0" indent="0" algn="l" rtl="0">
-              <a:spcBef>
-                <a:spcPts val="1600"/>
-              </a:spcBef>
-              <a:spcAft>
-                <a:spcPts val="0"/>
-              </a:spcAft>
-              <a:buNone/>
-            </a:pPr>
             <a:r>
               <a:rPr lang="en" dirty="0"/>
-              <a:t>Final training accuracy value:</a:t>
-            </a:r>
-            <a:endParaRPr dirty="0"/>
-          </a:p>
-          <a:p>
-            <a:pPr marL="0" lvl="0" indent="0" algn="l" rtl="0">
-              <a:spcBef>
-                <a:spcPts val="1600"/>
-              </a:spcBef>
-              <a:spcAft>
-                <a:spcPts val="1600"/>
-              </a:spcAft>
-              <a:buNone/>
-            </a:pPr>
-            <a:r>
-              <a:rPr lang="en" dirty="0"/>
-              <a:t>Final validation accuracy value:</a:t>
+              <a:t>Final validation accuracy value</a:t>
+            </a:r>
+            <a:r>
+              <a:rPr lang="en" dirty="0" smtClean="0"/>
+              <a:t>:</a:t>
+            </a:r>
+            <a:r>
+              <a:rPr lang="en-US" dirty="0" smtClean="0"/>
+              <a:t> </a:t>
+            </a:r>
+            <a:r>
+              <a:rPr lang="is-IS" dirty="0"/>
+              <a:t>0.5346666666666666</a:t>
             </a:r>
             <a:endParaRPr dirty="0"/>
           </a:p>
         </p:txBody>
       </p:sp>
+      <p:pic>
+        <p:nvPicPr>
+          <p:cNvPr id="4" name="Picture 3"/>
+          <p:cNvPicPr>
+            <a:picLocks noChangeAspect="1"/>
+          </p:cNvPicPr>
+          <p:nvPr/>
+        </p:nvPicPr>
+        <p:blipFill>
+          <a:blip r:embed="rId3">
+            <a:extLst>
+              <a:ext uri="{28A0092B-C50C-407E-A947-70E740481C1C}">
+                <a14:useLocalDpi xmlns:a14="http://schemas.microsoft.com/office/drawing/2010/main" val="0"/>
+              </a:ext>
+            </a:extLst>
+          </a:blip>
+          <a:stretch>
+            <a:fillRect/>
+          </a:stretch>
+        </p:blipFill>
+        <p:spPr>
+          <a:xfrm>
+            <a:off x="681628" y="1269410"/>
+            <a:ext cx="3436894" cy="2468880"/>
+          </a:xfrm>
+          <a:prstGeom prst="rect">
+            <a:avLst/>
+          </a:prstGeom>
+        </p:spPr>
+      </p:pic>
+      <p:pic>
+        <p:nvPicPr>
+          <p:cNvPr id="5" name="Picture 4"/>
+          <p:cNvPicPr>
+            <a:picLocks noChangeAspect="1"/>
+          </p:cNvPicPr>
+          <p:nvPr/>
+        </p:nvPicPr>
+        <p:blipFill>
+          <a:blip r:embed="rId4">
+            <a:extLst>
+              <a:ext uri="{28A0092B-C50C-407E-A947-70E740481C1C}">
+                <a14:useLocalDpi xmlns:a14="http://schemas.microsoft.com/office/drawing/2010/main" val="0"/>
+              </a:ext>
+            </a:extLst>
+          </a:blip>
+          <a:stretch>
+            <a:fillRect/>
+          </a:stretch>
+        </p:blipFill>
+        <p:spPr>
+          <a:xfrm>
+            <a:off x="4646771" y="1269410"/>
+            <a:ext cx="3490179" cy="2468880"/>
+          </a:xfrm>
+          <a:prstGeom prst="rect">
+            <a:avLst/>
+          </a:prstGeom>
+        </p:spPr>
+      </p:pic>
     </p:spTree>
   </p:cSld>
   <p:clrMapOvr>
@@ -7596,6 +7685,67 @@
             <a:endParaRPr b="1" dirty="0"/>
           </a:p>
           <a:p>
+            <a:pPr marL="0" lvl="0" indent="0">
+              <a:spcBef>
+                <a:spcPts val="1600"/>
+              </a:spcBef>
+              <a:buNone/>
+            </a:pPr>
+            <a:r>
+              <a:rPr lang="en-US" sz="1000" dirty="0" smtClean="0"/>
+              <a:t>(Base Performance: With default parameters, optimized with Adam wit </a:t>
+            </a:r>
+            <a:r>
+              <a:rPr lang="it-IT" sz="1000" dirty="0"/>
+              <a:t>"</a:t>
+            </a:r>
+            <a:r>
+              <a:rPr lang="it-IT" sz="1000" dirty="0" err="1"/>
+              <a:t>lr</a:t>
+            </a:r>
+            <a:r>
+              <a:rPr lang="it-IT" sz="1000" dirty="0"/>
+              <a:t>": 2e-3, "weight_decay": </a:t>
+            </a:r>
+            <a:r>
+              <a:rPr lang="it-IT" sz="1000" dirty="0" smtClean="0"/>
+              <a:t>1e-2, first 5 epochs gives </a:t>
+            </a:r>
+            <a:r>
+              <a:rPr lang="hr-HR" sz="1000" dirty="0" err="1" smtClean="0"/>
+              <a:t>an</a:t>
+            </a:r>
+            <a:r>
+              <a:rPr lang="hr-HR" sz="1000" dirty="0" smtClean="0"/>
+              <a:t> </a:t>
+            </a:r>
+            <a:r>
+              <a:rPr lang="hr-HR" sz="1000" dirty="0" err="1" smtClean="0"/>
+              <a:t>average</a:t>
+            </a:r>
+            <a:r>
+              <a:rPr lang="hr-HR" sz="1000" dirty="0" smtClean="0"/>
+              <a:t> </a:t>
+            </a:r>
+            <a:r>
+              <a:rPr lang="hr-HR" sz="1000" dirty="0" err="1" smtClean="0"/>
+              <a:t>loss</a:t>
+            </a:r>
+            <a:r>
+              <a:rPr lang="hr-HR" sz="1000" dirty="0" smtClean="0"/>
+              <a:t> </a:t>
+            </a:r>
+            <a:r>
+              <a:rPr lang="hr-HR" sz="1000" dirty="0" err="1" smtClean="0"/>
+              <a:t>of</a:t>
+            </a:r>
+            <a:r>
+              <a:rPr lang="hr-HR" sz="1000" dirty="0" smtClean="0"/>
+              <a:t> 1.2)</a:t>
+            </a:r>
+            <a:endParaRPr lang="en-US" sz="1000" dirty="0" smtClean="0"/>
+          </a:p>
+          <a:p>
             <a:pPr marL="0" lvl="0" indent="0" algn="l" rtl="0">
               <a:spcBef>
                 <a:spcPts val="1600"/>
@@ -7606,10 +7756,50 @@
               <a:buNone/>
             </a:pPr>
             <a:r>
-              <a:rPr lang="en" dirty="0"/>
-              <a:t>Kernel size:</a:t>
-            </a:r>
-            <a:endParaRPr/>
+              <a:rPr lang="en" sz="1200" dirty="0" smtClean="0"/>
+              <a:t>Kernel </a:t>
+            </a:r>
+            <a:r>
+              <a:rPr lang="en" sz="1200" dirty="0"/>
+              <a:t>size</a:t>
+            </a:r>
+            <a:r>
+              <a:rPr lang="en" sz="1200" dirty="0" smtClean="0"/>
+              <a:t>:</a:t>
+            </a:r>
+            <a:r>
+              <a:rPr lang="en-US" sz="1200" dirty="0" smtClean="0"/>
+              <a:t> </a:t>
+            </a:r>
+            <a:r>
+              <a:rPr lang="en-US" sz="1000" dirty="0" smtClean="0"/>
+              <a:t>W</a:t>
+            </a:r>
+            <a:r>
+              <a:rPr lang="en-US" sz="1000" dirty="0" smtClean="0"/>
+              <a:t>hen I increased kernel size to (15,15) for both Conv2d layers, performance increased significantly with an average loss </a:t>
+            </a:r>
+            <a:r>
+              <a:rPr lang="en-US" sz="1000" dirty="0"/>
+              <a:t>of </a:t>
+            </a:r>
+            <a:r>
+              <a:rPr lang="en-US" sz="1000" dirty="0" smtClean="0"/>
+              <a:t>0.85 for </a:t>
+            </a:r>
+            <a:r>
+              <a:rPr lang="en-US" sz="1000" dirty="0"/>
+              <a:t>the first 5 </a:t>
+            </a:r>
+            <a:r>
+              <a:rPr lang="en-US" sz="1000" dirty="0" smtClean="0"/>
+              <a:t>epochs</a:t>
+            </a:r>
+            <a:r>
+              <a:rPr lang="en-US" sz="1000" dirty="0" smtClean="0"/>
+              <a:t>, and training time decreased. The reason for the increase of performance may be because with a bigger kernel, the filter is able to learn more of a feature than the tiny details in the picture. With a bigger kernel size, the output size will be smaller, thus less computation needed and the training speed is faster.</a:t>
+            </a:r>
+            <a:endParaRPr dirty="0"/>
           </a:p>
           <a:p>
             <a:pPr marL="0" lvl="0" indent="0" algn="l" rtl="0">
@@ -7621,35 +7811,39 @@
               </a:spcAft>
               <a:buNone/>
             </a:pPr>
-            <a:endParaRPr/>
-          </a:p>
-          <a:p>
-            <a:pPr marL="0" lvl="0" indent="0" algn="l" rtl="0">
-              <a:spcBef>
-                <a:spcPts val="1600"/>
-              </a:spcBef>
-              <a:spcAft>
-                <a:spcPts val="0"/>
-              </a:spcAft>
-              <a:buNone/>
-            </a:pPr>
-            <a:r>
-              <a:rPr lang="en" dirty="0"/>
-              <a:t>Stride size:</a:t>
-            </a:r>
-            <a:endParaRPr dirty="0"/>
-          </a:p>
-          <a:p>
-            <a:pPr marL="0" lvl="0" indent="0" algn="l" rtl="0">
-              <a:spcBef>
-                <a:spcPts val="1600"/>
-              </a:spcBef>
-              <a:spcAft>
-                <a:spcPts val="0"/>
-              </a:spcAft>
-              <a:buNone/>
-            </a:pPr>
-            <a:endParaRPr dirty="0"/>
+            <a:r>
+              <a:rPr lang="en" sz="1200" dirty="0"/>
+              <a:t>Stride </a:t>
+            </a:r>
+            <a:r>
+              <a:rPr lang="en" sz="1200" dirty="0" smtClean="0"/>
+              <a:t>size:</a:t>
+            </a:r>
+            <a:r>
+              <a:rPr lang="en-US" sz="1200" dirty="0"/>
+              <a:t> </a:t>
+            </a:r>
+            <a:r>
+              <a:rPr lang="en-US" sz="1000" dirty="0" smtClean="0"/>
+              <a:t>When </a:t>
+            </a:r>
+            <a:r>
+              <a:rPr lang="en-US" sz="1000" dirty="0"/>
+              <a:t>I increased </a:t>
+            </a:r>
+            <a:r>
+              <a:rPr lang="en-US" sz="1000" dirty="0" smtClean="0"/>
+              <a:t>stride size to 5 for </a:t>
+            </a:r>
+            <a:r>
+              <a:rPr lang="en-US" sz="1000" dirty="0"/>
+              <a:t>both Conv2d </a:t>
+            </a:r>
+            <a:r>
+              <a:rPr lang="en-US" sz="1000" dirty="0" smtClean="0"/>
+              <a:t>layers, performance increased with an average loss of 0.70 for the first 5 epochs, and training time again decreased. Again, increasing the stride size decreases the output size, thus speeding up the training. The same observation still holds true when I increase the stride to 30. However, as I increase it to 100, performance is not as good as 5 or 30. </a:t>
+            </a:r>
+            <a:endParaRPr sz="1000" dirty="0"/>
           </a:p>
           <a:p>
             <a:pPr marL="0" lvl="0" indent="0" algn="l" rtl="0">
@@ -7670,10 +7864,30 @@
               <a:t>nn.Linear</a:t>
             </a:r>
             <a:r>
-              <a:rPr lang="en" dirty="0"/>
+              <a:rPr lang="en" dirty="0" smtClean="0"/>
               <a:t>:</a:t>
             </a:r>
-            <a:endParaRPr dirty="0"/>
+            <a:r>
+              <a:rPr lang="en-US" dirty="0" smtClean="0"/>
+              <a:t> </a:t>
+            </a:r>
+            <a:r>
+              <a:rPr lang="en-US" sz="1000" dirty="0" smtClean="0"/>
+              <a:t>When I increased </a:t>
+            </a:r>
+            <a:r>
+              <a:rPr lang="en-US" sz="1000" dirty="0" err="1" smtClean="0"/>
+              <a:t>nn.Linear</a:t>
+            </a:r>
+            <a:r>
+              <a:rPr lang="en-US" sz="1000" dirty="0"/>
+              <a:t> </a:t>
+            </a:r>
+            <a:r>
+              <a:rPr lang="en-US" sz="1000" dirty="0" smtClean="0"/>
+              <a:t>to be 1000 -&gt; 200 -&gt; 15, speed decreased as neuron thus more computation is needed. Training performance is slightly improved, however the loss fluctuates move in the early phase of training. </a:t>
+            </a:r>
+            <a:endParaRPr sz="1000" dirty="0"/>
           </a:p>
         </p:txBody>
       </p:sp>
@@ -7737,10 +7951,18 @@
               <a:buNone/>
             </a:pPr>
             <a:r>
-              <a:rPr lang="en" b="1"/>
-              <a:t>Part 2: Screenshot of your get_data_augmentation_transforms()</a:t>
-            </a:r>
-            <a:endParaRPr b="1"/>
+              <a:rPr lang="en" b="1" dirty="0"/>
+              <a:t>Part 2: Screenshot of your </a:t>
+            </a:r>
+            <a:r>
+              <a:rPr lang="en" b="1" dirty="0" err="1"/>
+              <a:t>get_data_augmentation_transforms</a:t>
+            </a:r>
+            <a:r>
+              <a:rPr lang="en" b="1" dirty="0"/>
+              <a:t>()</a:t>
+            </a:r>
+            <a:endParaRPr b="1" dirty="0"/>
           </a:p>
           <a:p>
             <a:pPr marL="0" lvl="0" indent="0" algn="l" rtl="0">
@@ -7752,11 +7974,7 @@
               </a:spcAft>
               <a:buNone/>
             </a:pPr>
-            <a:r>
-              <a:rPr lang="en"/>
-              <a:t>&lt;Screenshot here&gt;							</a:t>
-            </a:r>
-            <a:endParaRPr/>
+            <a:endParaRPr dirty="0"/>
           </a:p>
           <a:p>
             <a:pPr marL="0" lvl="0" indent="0" algn="l" rtl="0">
@@ -7768,7 +7986,7 @@
               </a:spcAft>
               <a:buNone/>
             </a:pPr>
-            <a:endParaRPr/>
+            <a:endParaRPr dirty="0"/>
           </a:p>
           <a:p>
             <a:pPr marL="0" lvl="0" indent="0" algn="l" rtl="0">
@@ -7780,7 +7998,7 @@
               </a:spcAft>
               <a:buNone/>
             </a:pPr>
-            <a:endParaRPr/>
+            <a:endParaRPr dirty="0"/>
           </a:p>
           <a:p>
             <a:pPr marL="0" lvl="0" indent="0" algn="l" rtl="0">
@@ -7792,7 +8010,7 @@
               </a:spcAft>
               <a:buNone/>
             </a:pPr>
-            <a:endParaRPr/>
+            <a:endParaRPr dirty="0"/>
           </a:p>
           <a:p>
             <a:pPr marL="0" lvl="0" indent="0" algn="l" rtl="0">
@@ -7804,7 +8022,7 @@
               </a:spcAft>
               <a:buNone/>
             </a:pPr>
-            <a:endParaRPr/>
+            <a:endParaRPr dirty="0"/>
           </a:p>
           <a:p>
             <a:pPr marL="0" lvl="0" indent="0" algn="l" rtl="0">
@@ -7812,26 +8030,44 @@
                 <a:spcPts val="1600"/>
               </a:spcBef>
               <a:spcAft>
-                <a:spcPts val="0"/>
+                <a:spcPts val="1600"/>
               </a:spcAft>
               <a:buNone/>
             </a:pPr>
-            <a:endParaRPr/>
-          </a:p>
-          <a:p>
-            <a:pPr marL="0" lvl="0" indent="0" algn="l" rtl="0">
-              <a:spcBef>
-                <a:spcPts val="1600"/>
-              </a:spcBef>
-              <a:spcAft>
-                <a:spcPts val="1600"/>
-              </a:spcAft>
-              <a:buNone/>
-            </a:pPr>
-            <a:endParaRPr/>
+            <a:endParaRPr dirty="0"/>
           </a:p>
         </p:txBody>
       </p:sp>
+      <p:pic>
+        <p:nvPicPr>
+          <p:cNvPr id="2" name="Picture 1"/>
+          <p:cNvPicPr>
+            <a:picLocks noChangeAspect="1"/>
+          </p:cNvPicPr>
+          <p:nvPr/>
+        </p:nvPicPr>
+        <p:blipFill>
+          <a:blip r:embed="rId3">
+            <a:extLst>
+              <a:ext uri="{28A0092B-C50C-407E-A947-70E740481C1C}">
+                <a14:useLocalDpi xmlns:a14="http://schemas.microsoft.com/office/drawing/2010/main" val="0"/>
+              </a:ext>
+            </a:extLst>
+          </a:blip>
+          <a:stretch>
+            <a:fillRect/>
+          </a:stretch>
+        </p:blipFill>
+        <p:spPr>
+          <a:xfrm>
+            <a:off x="2469818" y="963468"/>
+            <a:ext cx="4037263" cy="3947421"/>
+          </a:xfrm>
+          <a:prstGeom prst="rect">
+            <a:avLst/>
+          </a:prstGeom>
+        </p:spPr>
+      </p:pic>
     </p:spTree>
   </p:cSld>
   <p:clrMapOvr>
@@ -7869,8 +8105,8 @@
         </p:nvSpPr>
         <p:spPr>
           <a:xfrm>
-            <a:off x="311700" y="438800"/>
-            <a:ext cx="8353500" cy="4130100"/>
+            <a:off x="311700" y="438799"/>
+            <a:ext cx="8353500" cy="4510189"/>
           </a:xfrm>
           <a:prstGeom prst="rect">
             <a:avLst/>
@@ -7907,11 +8143,7 @@
               </a:spcAft>
               <a:buNone/>
             </a:pPr>
-            <a:r>
-              <a:rPr lang="en" dirty="0"/>
-              <a:t>&lt;Loss plot here&gt;				&lt;Accuracy plot here&gt;</a:t>
-            </a:r>
-            <a:endParaRPr dirty="0"/>
+            <a:endParaRPr lang="en-US" dirty="0" smtClean="0"/>
           </a:p>
           <a:p>
             <a:pPr marL="0" lvl="0" indent="0" algn="l" rtl="0">
@@ -7986,23 +8218,32 @@
             <a:endParaRPr dirty="0"/>
           </a:p>
           <a:p>
-            <a:pPr marL="0" lvl="0" indent="0" algn="l" rtl="0">
-              <a:spcBef>
-                <a:spcPts val="1600"/>
-              </a:spcBef>
-              <a:spcAft>
-                <a:spcPts val="0"/>
-              </a:spcAft>
+            <a:pPr marL="0" lvl="0" indent="0">
+              <a:spcBef>
+                <a:spcPts val="1600"/>
+              </a:spcBef>
               <a:buNone/>
             </a:pPr>
             <a:r>
               <a:rPr lang="en" dirty="0"/>
-              <a:t>Final training accuracy value:</a:t>
+              <a:t>Final training accuracy value</a:t>
+            </a:r>
+            <a:r>
+              <a:rPr lang="en" dirty="0" smtClean="0"/>
+              <a:t>:</a:t>
+            </a:r>
+            <a:r>
+              <a:rPr lang="en-US" dirty="0" smtClean="0"/>
+              <a:t> </a:t>
+            </a:r>
+            <a:r>
+              <a:rPr lang="is-IS" dirty="0"/>
+              <a:t>0.7179229480737018</a:t>
             </a:r>
             <a:endParaRPr dirty="0"/>
           </a:p>
           <a:p>
-            <a:pPr marL="0" lvl="0" indent="0" algn="l" rtl="0">
+            <a:pPr marL="0" lvl="0" indent="0">
               <a:spcBef>
                 <a:spcPts val="1600"/>
               </a:spcBef>
@@ -8013,12 +8254,84 @@
             </a:pPr>
             <a:r>
               <a:rPr lang="en" dirty="0"/>
-              <a:t>Final validation accuracy value:</a:t>
+              <a:t>Final validation accuracy value</a:t>
+            </a:r>
+            <a:r>
+              <a:rPr lang="en" dirty="0" smtClean="0"/>
+              <a:t>:</a:t>
+            </a:r>
+            <a:r>
+              <a:rPr lang="en-US" dirty="0" smtClean="0"/>
+              <a:t> </a:t>
+            </a:r>
+            <a:r>
+              <a:rPr lang="is-IS" dirty="0"/>
+              <a:t>0.5606666666666666</a:t>
             </a:r>
             <a:endParaRPr dirty="0"/>
           </a:p>
         </p:txBody>
       </p:sp>
+      <p:pic>
+        <p:nvPicPr>
+          <p:cNvPr id="2" name="Picture 1"/>
+          <p:cNvPicPr>
+            <a:picLocks noChangeAspect="1"/>
+          </p:cNvPicPr>
+          <p:nvPr/>
+        </p:nvPicPr>
+        <p:blipFill>
+          <a:blip r:embed="rId3">
+            <a:extLst>
+              <a:ext uri="{28A0092B-C50C-407E-A947-70E740481C1C}">
+                <a14:useLocalDpi xmlns:a14="http://schemas.microsoft.com/office/drawing/2010/main" val="0"/>
+              </a:ext>
+            </a:extLst>
+          </a:blip>
+          <a:stretch>
+            <a:fillRect/>
+          </a:stretch>
+        </p:blipFill>
+        <p:spPr>
+          <a:xfrm>
+            <a:off x="650545" y="1193131"/>
+            <a:ext cx="3499060" cy="2468880"/>
+          </a:xfrm>
+          <a:prstGeom prst="rect">
+            <a:avLst/>
+          </a:prstGeom>
+        </p:spPr>
+      </p:pic>
+      <p:pic>
+        <p:nvPicPr>
+          <p:cNvPr id="3" name="Picture 2"/>
+          <p:cNvPicPr>
+            <a:picLocks noChangeAspect="1"/>
+          </p:cNvPicPr>
+          <p:nvPr/>
+        </p:nvPicPr>
+        <p:blipFill>
+          <a:blip r:embed="rId4">
+            <a:extLst>
+              <a:ext uri="{28A0092B-C50C-407E-A947-70E740481C1C}">
+                <a14:useLocalDpi xmlns:a14="http://schemas.microsoft.com/office/drawing/2010/main" val="0"/>
+              </a:ext>
+            </a:extLst>
+          </a:blip>
+          <a:stretch>
+            <a:fillRect/>
+          </a:stretch>
+        </p:blipFill>
+        <p:spPr>
+          <a:xfrm>
+            <a:off x="4488450" y="1193131"/>
+            <a:ext cx="3436894" cy="2468880"/>
+          </a:xfrm>
+          <a:prstGeom prst="rect">
+            <a:avLst/>
+          </a:prstGeom>
+        </p:spPr>
+      </p:pic>
     </p:spTree>
   </p:cSld>
   <p:clrMapOvr>

</xml_diff>